<commit_message>
SLD-68: Add API to get paragraph bullet color
</commit_message>
<xml_diff>
--- a/src/SlideDotNet.Tests/Resource/002.pptx
+++ b/src/SlideDotNet.Tests/Resource/002.pptx
@@ -6,6 +6,7 @@
   </p:sldMasterIdLst>
   <p:sldIdLst>
     <p:sldId id="256" r:id="rId2"/>
+    <p:sldId id="257" r:id="rId3"/>
   </p:sldIdLst>
   <p:sldSz cx="12192000" cy="6858000"/>
   <p:notesSz cx="6858000" cy="9144000"/>
@@ -115,7 +116,7 @@
 <file path=ppt/charts/chart1.xml><?xml version="1.0" encoding="utf-8"?>
 <c:chartSpace xmlns:c="http://schemas.openxmlformats.org/drawingml/2006/chart" xmlns:a="http://schemas.openxmlformats.org/drawingml/2006/main" xmlns:r="http://schemas.openxmlformats.org/officeDocument/2006/relationships" xmlns:c16r2="http://schemas.microsoft.com/office/drawing/2015/06/chart">
   <c:date1904 val="0"/>
-  <c:lang val="ru-RU"/>
+  <c:lang val="en-US"/>
   <c:roundedCorners val="0"/>
   <mc:AlternateContent xmlns:mc="http://schemas.openxmlformats.org/markup-compatibility/2006">
     <mc:Choice xmlns:c14="http://schemas.microsoft.com/office/drawing/2007/8/2/chart" Requires="c14">
@@ -152,7 +153,7 @@
               <a:cs typeface="+mn-cs"/>
             </a:defRPr>
           </a:pPr>
-          <a:endParaRPr lang="ru-UA"/>
+          <a:endParaRPr lang="ru-RU"/>
         </a:p>
       </c:txPr>
     </c:title>
@@ -430,7 +431,7 @@
                 <a:cs typeface="+mn-cs"/>
               </a:defRPr>
             </a:pPr>
-            <a:endParaRPr lang="ru-UA"/>
+            <a:endParaRPr lang="ru-RU"/>
           </a:p>
         </c:txPr>
         <c:crossAx val="710568552"/>
@@ -489,7 +490,7 @@
                 <a:cs typeface="+mn-cs"/>
               </a:defRPr>
             </a:pPr>
-            <a:endParaRPr lang="ru-UA"/>
+            <a:endParaRPr lang="ru-RU"/>
           </a:p>
         </c:txPr>
         <c:crossAx val="710567240"/>
@@ -531,7 +532,7 @@
               <a:cs typeface="+mn-cs"/>
             </a:defRPr>
           </a:pPr>
-          <a:endParaRPr lang="ru-UA"/>
+          <a:endParaRPr lang="ru-RU"/>
         </a:p>
       </c:txPr>
     </c:legend>
@@ -560,7 +561,7 @@
       <a:pPr>
         <a:defRPr/>
       </a:pPr>
-      <a:endParaRPr lang="ru-UA"/>
+      <a:endParaRPr lang="ru-RU"/>
     </a:p>
   </c:txPr>
   <c:externalData r:id="rId3">
@@ -1261,7 +1262,7 @@
           <a:p>
             <a:fld id="{6A2D1428-0459-4F75-829F-043936AE8C9E}" type="datetimeFigureOut">
               <a:rPr lang="en-US" smtClean="0"/>
-              <a:t>12/6/2019</a:t>
+              <a:t>10/3/2020</a:t>
             </a:fld>
             <a:endParaRPr lang="en-US"/>
           </a:p>
@@ -1461,7 +1462,7 @@
           <a:p>
             <a:fld id="{6A2D1428-0459-4F75-829F-043936AE8C9E}" type="datetimeFigureOut">
               <a:rPr lang="en-US" smtClean="0"/>
-              <a:t>12/6/2019</a:t>
+              <a:t>10/3/2020</a:t>
             </a:fld>
             <a:endParaRPr lang="en-US"/>
           </a:p>
@@ -1671,7 +1672,7 @@
           <a:p>
             <a:fld id="{6A2D1428-0459-4F75-829F-043936AE8C9E}" type="datetimeFigureOut">
               <a:rPr lang="en-US" smtClean="0"/>
-              <a:t>12/6/2019</a:t>
+              <a:t>10/3/2020</a:t>
             </a:fld>
             <a:endParaRPr lang="en-US"/>
           </a:p>
@@ -1871,7 +1872,7 @@
           <a:p>
             <a:fld id="{6A2D1428-0459-4F75-829F-043936AE8C9E}" type="datetimeFigureOut">
               <a:rPr lang="en-US" smtClean="0"/>
-              <a:t>12/6/2019</a:t>
+              <a:t>10/3/2020</a:t>
             </a:fld>
             <a:endParaRPr lang="en-US"/>
           </a:p>
@@ -2147,7 +2148,7 @@
           <a:p>
             <a:fld id="{6A2D1428-0459-4F75-829F-043936AE8C9E}" type="datetimeFigureOut">
               <a:rPr lang="en-US" smtClean="0"/>
-              <a:t>12/6/2019</a:t>
+              <a:t>10/3/2020</a:t>
             </a:fld>
             <a:endParaRPr lang="en-US"/>
           </a:p>
@@ -2415,7 +2416,7 @@
           <a:p>
             <a:fld id="{6A2D1428-0459-4F75-829F-043936AE8C9E}" type="datetimeFigureOut">
               <a:rPr lang="en-US" smtClean="0"/>
-              <a:t>12/6/2019</a:t>
+              <a:t>10/3/2020</a:t>
             </a:fld>
             <a:endParaRPr lang="en-US"/>
           </a:p>
@@ -2830,7 +2831,7 @@
           <a:p>
             <a:fld id="{6A2D1428-0459-4F75-829F-043936AE8C9E}" type="datetimeFigureOut">
               <a:rPr lang="en-US" smtClean="0"/>
-              <a:t>12/6/2019</a:t>
+              <a:t>10/3/2020</a:t>
             </a:fld>
             <a:endParaRPr lang="en-US"/>
           </a:p>
@@ -2972,7 +2973,7 @@
           <a:p>
             <a:fld id="{6A2D1428-0459-4F75-829F-043936AE8C9E}" type="datetimeFigureOut">
               <a:rPr lang="en-US" smtClean="0"/>
-              <a:t>12/6/2019</a:t>
+              <a:t>10/3/2020</a:t>
             </a:fld>
             <a:endParaRPr lang="en-US"/>
           </a:p>
@@ -3085,7 +3086,7 @@
           <a:p>
             <a:fld id="{6A2D1428-0459-4F75-829F-043936AE8C9E}" type="datetimeFigureOut">
               <a:rPr lang="en-US" smtClean="0"/>
-              <a:t>12/6/2019</a:t>
+              <a:t>10/3/2020</a:t>
             </a:fld>
             <a:endParaRPr lang="en-US"/>
           </a:p>
@@ -3398,7 +3399,7 @@
           <a:p>
             <a:fld id="{6A2D1428-0459-4F75-829F-043936AE8C9E}" type="datetimeFigureOut">
               <a:rPr lang="en-US" smtClean="0"/>
-              <a:t>12/6/2019</a:t>
+              <a:t>10/3/2020</a:t>
             </a:fld>
             <a:endParaRPr lang="en-US"/>
           </a:p>
@@ -3687,7 +3688,7 @@
           <a:p>
             <a:fld id="{6A2D1428-0459-4F75-829F-043936AE8C9E}" type="datetimeFigureOut">
               <a:rPr lang="en-US" smtClean="0"/>
-              <a:t>12/6/2019</a:t>
+              <a:t>10/3/2020</a:t>
             </a:fld>
             <a:endParaRPr lang="en-US"/>
           </a:p>
@@ -3930,7 +3931,7 @@
           <a:p>
             <a:fld id="{6A2D1428-0459-4F75-829F-043936AE8C9E}" type="datetimeFigureOut">
               <a:rPr lang="en-US" smtClean="0"/>
-              <a:t>12/6/2019</a:t>
+              <a:t>10/3/2020</a:t>
             </a:fld>
             <a:endParaRPr lang="en-US"/>
           </a:p>
@@ -4528,6 +4529,166 @@
 </p:sld>
 </file>
 
+<file path=ppt/slides/slide2.xml><?xml version="1.0" encoding="utf-8"?>
+<p:sld xmlns:a="http://schemas.openxmlformats.org/drawingml/2006/main" xmlns:r="http://schemas.openxmlformats.org/officeDocument/2006/relationships" xmlns:p="http://schemas.openxmlformats.org/presentationml/2006/main">
+  <p:cSld>
+    <p:spTree>
+      <p:nvGrpSpPr>
+        <p:cNvPr id="1" name=""/>
+        <p:cNvGrpSpPr/>
+        <p:nvPr/>
+      </p:nvGrpSpPr>
+      <p:grpSpPr>
+        <a:xfrm>
+          <a:off x="0" y="0"/>
+          <a:ext cx="0" cy="0"/>
+          <a:chOff x="0" y="0"/>
+          <a:chExt cx="0" cy="0"/>
+        </a:xfrm>
+      </p:grpSpPr>
+      <p:sp>
+        <p:nvSpPr>
+          <p:cNvPr id="4" name="TextBox 3">
+            <a:extLst>
+              <a:ext uri="{FF2B5EF4-FFF2-40B4-BE49-F238E27FC236}">
+                <a16:creationId xmlns:a16="http://schemas.microsoft.com/office/drawing/2014/main" id="{70129846-FC54-481F-8B2F-C423A1101E08}"/>
+              </a:ext>
+            </a:extLst>
+          </p:cNvPr>
+          <p:cNvSpPr txBox="1"/>
+          <p:nvPr/>
+        </p:nvSpPr>
+        <p:spPr>
+          <a:xfrm>
+            <a:off x="1914769" y="1555262"/>
+            <a:ext cx="1153842" cy="923330"/>
+          </a:xfrm>
+          <a:prstGeom prst="rect">
+            <a:avLst/>
+          </a:prstGeom>
+        </p:spPr>
+        <p:style>
+          <a:lnRef idx="2">
+            <a:schemeClr val="accent5"/>
+          </a:lnRef>
+          <a:fillRef idx="1">
+            <a:schemeClr val="lt1"/>
+          </a:fillRef>
+          <a:effectRef idx="0">
+            <a:schemeClr val="accent5"/>
+          </a:effectRef>
+          <a:fontRef idx="minor">
+            <a:schemeClr val="dk1"/>
+          </a:fontRef>
+        </p:style>
+        <p:txBody>
+          <a:bodyPr wrap="none" rtlCol="0">
+            <a:spAutoFit/>
+          </a:bodyPr>
+          <a:lstStyle/>
+          <a:p>
+            <a:pPr marL="285750" indent="-285750">
+              <a:buFont typeface="Arial" panose="020B0604020202020204" pitchFamily="34" charset="0"/>
+              <a:buChar char="•"/>
+            </a:pPr>
+            <a:r>
+              <a:rPr lang="en-US" dirty="0"/>
+              <a:t>Test-p1</a:t>
+            </a:r>
+          </a:p>
+          <a:p>
+            <a:pPr marL="285750" indent="-285750">
+              <a:buClr>
+                <a:srgbClr val="C00000"/>
+              </a:buClr>
+              <a:buFont typeface="Arial" panose="020B0604020202020204" pitchFamily="34" charset="0"/>
+              <a:buChar char="•"/>
+            </a:pPr>
+            <a:r>
+              <a:rPr lang="en-US" dirty="0"/>
+              <a:t>Test-p2</a:t>
+            </a:r>
+          </a:p>
+          <a:p>
+            <a:pPr>
+              <a:buClr>
+                <a:srgbClr val="C00000"/>
+              </a:buClr>
+            </a:pPr>
+            <a:r>
+              <a:rPr lang="en-US" dirty="0"/>
+              <a:t>Test-p3</a:t>
+            </a:r>
+            <a:endParaRPr lang="ru-RU" dirty="0"/>
+          </a:p>
+        </p:txBody>
+      </p:sp>
+      <p:sp>
+        <p:nvSpPr>
+          <p:cNvPr id="2" name="TextBox 1">
+            <a:extLst>
+              <a:ext uri="{FF2B5EF4-FFF2-40B4-BE49-F238E27FC236}">
+                <a16:creationId xmlns:a16="http://schemas.microsoft.com/office/drawing/2014/main" id="{B12DDA8F-40C5-49FE-A00D-D83E5F8A6E63}"/>
+              </a:ext>
+            </a:extLst>
+          </p:cNvPr>
+          <p:cNvSpPr txBox="1"/>
+          <p:nvPr/>
+        </p:nvSpPr>
+        <p:spPr>
+          <a:xfrm>
+            <a:off x="3524738" y="1555262"/>
+            <a:ext cx="1153842" cy="369332"/>
+          </a:xfrm>
+          <a:prstGeom prst="rect">
+            <a:avLst/>
+          </a:prstGeom>
+        </p:spPr>
+        <p:style>
+          <a:lnRef idx="2">
+            <a:schemeClr val="accent5"/>
+          </a:lnRef>
+          <a:fillRef idx="1">
+            <a:schemeClr val="lt1"/>
+          </a:fillRef>
+          <a:effectRef idx="0">
+            <a:schemeClr val="accent5"/>
+          </a:effectRef>
+          <a:fontRef idx="minor">
+            <a:schemeClr val="dk1"/>
+          </a:fontRef>
+        </p:style>
+        <p:txBody>
+          <a:bodyPr wrap="none" rtlCol="0">
+            <a:spAutoFit/>
+          </a:bodyPr>
+          <a:lstStyle/>
+          <a:p>
+            <a:pPr marL="285750" indent="-285750">
+              <a:buFont typeface="Arial" panose="020B0604020202020204" pitchFamily="34" charset="0"/>
+              <a:buChar char="•"/>
+            </a:pPr>
+            <a:r>
+              <a:rPr lang="en-US" dirty="0"/>
+              <a:t>Test-p4</a:t>
+            </a:r>
+            <a:endParaRPr lang="ru-RU" dirty="0"/>
+          </a:p>
+        </p:txBody>
+      </p:sp>
+    </p:spTree>
+    <p:extLst>
+      <p:ext uri="{BB962C8B-B14F-4D97-AF65-F5344CB8AC3E}">
+        <p14:creationId xmlns:p14="http://schemas.microsoft.com/office/powerpoint/2010/main" val="1843988457"/>
+      </p:ext>
+    </p:extLst>
+  </p:cSld>
+  <p:clrMapOvr>
+    <a:masterClrMapping/>
+  </p:clrMapOvr>
+</p:sld>
+</file>
+
 <file path=ppt/theme/theme1.xml><?xml version="1.0" encoding="utf-8"?>
 <a:theme xmlns:a="http://schemas.openxmlformats.org/drawingml/2006/main" name="Тема Office">
   <a:themeElements>

</xml_diff>

<commit_message>
#70: Add paragraph bullet type
</commit_message>
<xml_diff>
--- a/src/SlideDotNet.Tests/Resource/002.pptx
+++ b/src/SlideDotNet.Tests/Resource/002.pptx
@@ -1262,7 +1262,7 @@
           <a:p>
             <a:fld id="{6A2D1428-0459-4F75-829F-043936AE8C9E}" type="datetimeFigureOut">
               <a:rPr lang="en-US" smtClean="0"/>
-              <a:t>10/3/2020</a:t>
+              <a:t>10/11/2020</a:t>
             </a:fld>
             <a:endParaRPr lang="en-US"/>
           </a:p>
@@ -1462,7 +1462,7 @@
           <a:p>
             <a:fld id="{6A2D1428-0459-4F75-829F-043936AE8C9E}" type="datetimeFigureOut">
               <a:rPr lang="en-US" smtClean="0"/>
-              <a:t>10/3/2020</a:t>
+              <a:t>10/11/2020</a:t>
             </a:fld>
             <a:endParaRPr lang="en-US"/>
           </a:p>
@@ -1672,7 +1672,7 @@
           <a:p>
             <a:fld id="{6A2D1428-0459-4F75-829F-043936AE8C9E}" type="datetimeFigureOut">
               <a:rPr lang="en-US" smtClean="0"/>
-              <a:t>10/3/2020</a:t>
+              <a:t>10/11/2020</a:t>
             </a:fld>
             <a:endParaRPr lang="en-US"/>
           </a:p>
@@ -1872,7 +1872,7 @@
           <a:p>
             <a:fld id="{6A2D1428-0459-4F75-829F-043936AE8C9E}" type="datetimeFigureOut">
               <a:rPr lang="en-US" smtClean="0"/>
-              <a:t>10/3/2020</a:t>
+              <a:t>10/11/2020</a:t>
             </a:fld>
             <a:endParaRPr lang="en-US"/>
           </a:p>
@@ -2148,7 +2148,7 @@
           <a:p>
             <a:fld id="{6A2D1428-0459-4F75-829F-043936AE8C9E}" type="datetimeFigureOut">
               <a:rPr lang="en-US" smtClean="0"/>
-              <a:t>10/3/2020</a:t>
+              <a:t>10/11/2020</a:t>
             </a:fld>
             <a:endParaRPr lang="en-US"/>
           </a:p>
@@ -2416,7 +2416,7 @@
           <a:p>
             <a:fld id="{6A2D1428-0459-4F75-829F-043936AE8C9E}" type="datetimeFigureOut">
               <a:rPr lang="en-US" smtClean="0"/>
-              <a:t>10/3/2020</a:t>
+              <a:t>10/11/2020</a:t>
             </a:fld>
             <a:endParaRPr lang="en-US"/>
           </a:p>
@@ -2831,7 +2831,7 @@
           <a:p>
             <a:fld id="{6A2D1428-0459-4F75-829F-043936AE8C9E}" type="datetimeFigureOut">
               <a:rPr lang="en-US" smtClean="0"/>
-              <a:t>10/3/2020</a:t>
+              <a:t>10/11/2020</a:t>
             </a:fld>
             <a:endParaRPr lang="en-US"/>
           </a:p>
@@ -2973,7 +2973,7 @@
           <a:p>
             <a:fld id="{6A2D1428-0459-4F75-829F-043936AE8C9E}" type="datetimeFigureOut">
               <a:rPr lang="en-US" smtClean="0"/>
-              <a:t>10/3/2020</a:t>
+              <a:t>10/11/2020</a:t>
             </a:fld>
             <a:endParaRPr lang="en-US"/>
           </a:p>
@@ -3086,7 +3086,7 @@
           <a:p>
             <a:fld id="{6A2D1428-0459-4F75-829F-043936AE8C9E}" type="datetimeFigureOut">
               <a:rPr lang="en-US" smtClean="0"/>
-              <a:t>10/3/2020</a:t>
+              <a:t>10/11/2020</a:t>
             </a:fld>
             <a:endParaRPr lang="en-US"/>
           </a:p>
@@ -3399,7 +3399,7 @@
           <a:p>
             <a:fld id="{6A2D1428-0459-4F75-829F-043936AE8C9E}" type="datetimeFigureOut">
               <a:rPr lang="en-US" smtClean="0"/>
-              <a:t>10/3/2020</a:t>
+              <a:t>10/11/2020</a:t>
             </a:fld>
             <a:endParaRPr lang="en-US"/>
           </a:p>
@@ -3688,7 +3688,7 @@
           <a:p>
             <a:fld id="{6A2D1428-0459-4F75-829F-043936AE8C9E}" type="datetimeFigureOut">
               <a:rPr lang="en-US" smtClean="0"/>
-              <a:t>10/3/2020</a:t>
+              <a:t>10/11/2020</a:t>
             </a:fld>
             <a:endParaRPr lang="en-US"/>
           </a:p>
@@ -3931,7 +3931,7 @@
           <a:p>
             <a:fld id="{6A2D1428-0459-4F75-829F-043936AE8C9E}" type="datetimeFigureOut">
               <a:rPr lang="en-US" smtClean="0"/>
-              <a:t>10/3/2020</a:t>
+              <a:t>10/11/2020</a:t>
             </a:fld>
             <a:endParaRPr lang="en-US"/>
           </a:p>
@@ -4601,8 +4601,9 @@
               <a:buClr>
                 <a:srgbClr val="C00000"/>
               </a:buClr>
-              <a:buFont typeface="Arial" panose="020B0604020202020204" pitchFamily="34" charset="0"/>
-              <a:buChar char="•"/>
+              <a:buSzPct val="120000"/>
+              <a:buFont typeface="Calibri" panose="020F0502020204030204" pitchFamily="34" charset="0"/>
+              <a:buChar char="'"/>
             </a:pPr>
             <a:r>
               <a:rPr lang="en-US" dirty="0"/>
@@ -4671,6 +4672,119 @@
             <a:r>
               <a:rPr lang="en-US" dirty="0"/>
               <a:t>Test-p4</a:t>
+            </a:r>
+            <a:endParaRPr lang="ru-RU" dirty="0"/>
+          </a:p>
+        </p:txBody>
+      </p:sp>
+      <p:sp>
+        <p:nvSpPr>
+          <p:cNvPr id="3" name="Rectangle 2">
+            <a:extLst>
+              <a:ext uri="{FF2B5EF4-FFF2-40B4-BE49-F238E27FC236}">
+                <a16:creationId xmlns:a16="http://schemas.microsoft.com/office/drawing/2014/main" id="{F5AE7B20-D60C-468B-89F2-FA80EB191730}"/>
+              </a:ext>
+            </a:extLst>
+          </p:cNvPr>
+          <p:cNvSpPr/>
+          <p:nvPr/>
+        </p:nvSpPr>
+        <p:spPr>
+          <a:xfrm>
+            <a:off x="4986046" y="1555262"/>
+            <a:ext cx="1559151" cy="286232"/>
+          </a:xfrm>
+          <a:prstGeom prst="rect">
+            <a:avLst/>
+          </a:prstGeom>
+        </p:spPr>
+        <p:txBody>
+          <a:bodyPr wrap="square">
+            <a:spAutoFit/>
+          </a:bodyPr>
+          <a:lstStyle/>
+          <a:p>
+            <a:pPr marL="111125" lvl="0" indent="-111125" defTabSz="966788" eaLnBrk="0" hangingPunct="0">
+              <a:lnSpc>
+                <a:spcPct val="90000"/>
+              </a:lnSpc>
+              <a:spcBef>
+                <a:spcPts val="900"/>
+              </a:spcBef>
+              <a:buClr>
+                <a:schemeClr val="bg2"/>
+              </a:buClr>
+              <a:buFontTx/>
+              <a:buChar char="•"/>
+            </a:pPr>
+            <a:r>
+              <a:rPr lang="en-US" sz="1400" dirty="0">
+                <a:cs typeface="Arial" charset="0"/>
+              </a:rPr>
+              <a:t>Third point</a:t>
+            </a:r>
+          </a:p>
+        </p:txBody>
+      </p:sp>
+      <p:sp>
+        <p:nvSpPr>
+          <p:cNvPr id="5" name="TextBox 4">
+            <a:extLst>
+              <a:ext uri="{FF2B5EF4-FFF2-40B4-BE49-F238E27FC236}">
+                <a16:creationId xmlns:a16="http://schemas.microsoft.com/office/drawing/2014/main" id="{56A0505B-E9F3-4667-B1AA-89F809E9592A}"/>
+              </a:ext>
+            </a:extLst>
+          </p:cNvPr>
+          <p:cNvSpPr txBox="1"/>
+          <p:nvPr/>
+        </p:nvSpPr>
+        <p:spPr>
+          <a:xfrm>
+            <a:off x="6359580" y="1555262"/>
+            <a:ext cx="1211550" cy="646331"/>
+          </a:xfrm>
+          <a:prstGeom prst="rect">
+            <a:avLst/>
+          </a:prstGeom>
+        </p:spPr>
+        <p:style>
+          <a:lnRef idx="2">
+            <a:schemeClr val="accent5"/>
+          </a:lnRef>
+          <a:fillRef idx="1">
+            <a:schemeClr val="lt1"/>
+          </a:fillRef>
+          <a:effectRef idx="0">
+            <a:schemeClr val="accent5"/>
+          </a:effectRef>
+          <a:fontRef idx="minor">
+            <a:schemeClr val="dk1"/>
+          </a:fontRef>
+        </p:style>
+        <p:txBody>
+          <a:bodyPr wrap="none" rtlCol="0">
+            <a:spAutoFit/>
+          </a:bodyPr>
+          <a:lstStyle/>
+          <a:p>
+            <a:pPr marL="342900" indent="-342900">
+              <a:buFont typeface="+mj-lt"/>
+              <a:buAutoNum type="arabicPeriod"/>
+            </a:pPr>
+            <a:r>
+              <a:rPr lang="en-US" dirty="0"/>
+              <a:t>Test-p6</a:t>
+            </a:r>
+          </a:p>
+          <a:p>
+            <a:pPr marL="342900" indent="-342900">
+              <a:buBlip>
+                <a:blip r:embed="rId2"/>
+              </a:buBlip>
+            </a:pPr>
+            <a:r>
+              <a:rPr lang="en-US" dirty="0"/>
+              <a:t>Test-p7</a:t>
             </a:r>
             <a:endParaRPr lang="ru-RU" dirty="0"/>
           </a:p>

</xml_diff>